<commit_message>
Sensder Receiver - Hello AMQP.
</commit_message>
<xml_diff>
--- a/Presentation/ActiveMQ.pptx
+++ b/Presentation/ActiveMQ.pptx
@@ -8,6 +8,11 @@
     <p:sldId id="257" r:id="rId5"/>
     <p:sldId id="259" r:id="rId6"/>
     <p:sldId id="260" r:id="rId7"/>
+    <p:sldId id="261" r:id="rId8"/>
+    <p:sldId id="262" r:id="rId9"/>
+    <p:sldId id="263" r:id="rId10"/>
+    <p:sldId id="264" r:id="rId11"/>
+    <p:sldId id="265" r:id="rId12"/>
   </p:sldIdLst>
   <p:sldSz cx="12192000" cy="6858000"/>
   <p:notesSz cx="6858000" cy="9144000"/>
@@ -352,7 +357,7 @@
           <a:p>
             <a:fld id="{ED291B17-9318-49DB-B28B-6E5994AE9581}" type="datetime1">
               <a:rPr lang="en-US" smtClean="0"/>
-              <a:t>3/1/2021</a:t>
+              <a:t>3/2/2021</a:t>
             </a:fld>
             <a:endParaRPr lang="en-US" dirty="0"/>
           </a:p>
@@ -555,7 +560,7 @@
           <a:p>
             <a:fld id="{2CED4963-E985-44C4-B8C4-FDD613B7C2F8}" type="datetime1">
               <a:rPr lang="en-US" smtClean="0"/>
-              <a:t>3/1/2021</a:t>
+              <a:t>3/2/2021</a:t>
             </a:fld>
             <a:endParaRPr lang="en-US" dirty="0"/>
           </a:p>
@@ -917,7 +922,7 @@
           <a:p>
             <a:fld id="{ED291B17-9318-49DB-B28B-6E5994AE9581}" type="datetime1">
               <a:rPr lang="en-US" smtClean="0"/>
-              <a:t>3/1/2021</a:t>
+              <a:t>3/2/2021</a:t>
             </a:fld>
             <a:endParaRPr lang="en-US" dirty="0"/>
           </a:p>
@@ -1115,7 +1120,7 @@
           <a:p>
             <a:fld id="{78DD82B9-B8EE-4375-B6FF-88FA6ABB15D9}" type="datetime1">
               <a:rPr lang="en-US" smtClean="0"/>
-              <a:t>3/1/2021</a:t>
+              <a:t>3/2/2021</a:t>
             </a:fld>
             <a:endParaRPr lang="en-US" dirty="0"/>
           </a:p>
@@ -1427,7 +1432,7 @@
           <a:p>
             <a:fld id="{B2497495-0637-405E-AE64-5CC7506D51F5}" type="datetime1">
               <a:rPr lang="en-US" smtClean="0"/>
-              <a:t>3/1/2021</a:t>
+              <a:t>3/2/2021</a:t>
             </a:fld>
             <a:endParaRPr lang="en-US" dirty="0"/>
           </a:p>
@@ -1680,7 +1685,7 @@
           <a:p>
             <a:fld id="{7BFFD690-9426-415D-8B65-26881E07B2D4}" type="datetime1">
               <a:rPr lang="en-US" smtClean="0"/>
-              <a:t>3/1/2021</a:t>
+              <a:t>3/2/2021</a:t>
             </a:fld>
             <a:endParaRPr lang="en-US" dirty="0"/>
           </a:p>
@@ -2102,7 +2107,7 @@
           <a:p>
             <a:fld id="{04C4989A-474C-40DE-95B9-011C28B71673}" type="datetime1">
               <a:rPr lang="en-US" smtClean="0"/>
-              <a:t>3/1/2021</a:t>
+              <a:t>3/2/2021</a:t>
             </a:fld>
             <a:endParaRPr lang="en-US" dirty="0"/>
           </a:p>
@@ -2225,7 +2230,7 @@
           <a:p>
             <a:fld id="{5DB4ED54-5B5E-4A04-93D3-5772E3CE3818}" type="datetime1">
               <a:rPr lang="en-US" smtClean="0"/>
-              <a:t>3/1/2021</a:t>
+              <a:t>3/2/2021</a:t>
             </a:fld>
             <a:endParaRPr lang="en-US" dirty="0"/>
           </a:p>
@@ -2320,7 +2325,7 @@
           <a:p>
             <a:fld id="{4EDE50D6-574B-40AF-946F-D52A04ADE379}" type="datetime1">
               <a:rPr lang="en-US" smtClean="0"/>
-              <a:t>3/1/2021</a:t>
+              <a:t>3/2/2021</a:t>
             </a:fld>
             <a:endParaRPr lang="en-US" dirty="0"/>
           </a:p>
@@ -2697,7 +2702,7 @@
           <a:p>
             <a:fld id="{D82884F1-FFEA-405F-9602-3DCA865EDA4E}" type="datetime1">
               <a:rPr lang="en-US" smtClean="0"/>
-              <a:t>3/1/2021</a:t>
+              <a:t>3/2/2021</a:t>
             </a:fld>
             <a:endParaRPr lang="en-US" dirty="0"/>
           </a:p>
@@ -2990,7 +2995,7 @@
           <a:p>
             <a:fld id="{7E18DB4A-8810-4A10-AD5C-D5E2C667F5B3}" type="datetime1">
               <a:rPr lang="en-US" smtClean="0"/>
-              <a:t>3/1/2021</a:t>
+              <a:t>3/2/2021</a:t>
             </a:fld>
             <a:endParaRPr lang="en-US" dirty="0"/>
           </a:p>
@@ -3205,7 +3210,7 @@
           <a:p>
             <a:fld id="{ED291B17-9318-49DB-B28B-6E5994AE9581}" type="datetime1">
               <a:rPr lang="en-US" smtClean="0"/>
-              <a:t>3/1/2021</a:t>
+              <a:t>3/2/2021</a:t>
             </a:fld>
             <a:endParaRPr lang="en-US" dirty="0"/>
           </a:p>
@@ -4410,10 +4415,10 @@
       </p:sp>
       <p:pic>
         <p:nvPicPr>
-          <p:cNvPr id="4" name="Picture 3">
+          <p:cNvPr id="5" name="Picture 4">
             <a:extLst>
               <a:ext uri="{FF2B5EF4-FFF2-40B4-BE49-F238E27FC236}">
-                <a16:creationId xmlns:a16="http://schemas.microsoft.com/office/drawing/2014/main" id="{1CDD1816-D1B4-462E-B3E4-A41B629D5136}"/>
+                <a16:creationId xmlns:a16="http://schemas.microsoft.com/office/drawing/2014/main" id="{4C135467-2D5E-489A-830D-3EF62FFAD1BA}"/>
               </a:ext>
             </a:extLst>
           </p:cNvPr>
@@ -4430,8 +4435,8 @@
         </p:blipFill>
         <p:spPr>
           <a:xfrm>
-            <a:off x="181142" y="1314450"/>
-            <a:ext cx="9134475" cy="1009650"/>
+            <a:off x="0" y="1314450"/>
+            <a:ext cx="12192000" cy="5543550"/>
           </a:xfrm>
           <a:prstGeom prst="rect">
             <a:avLst/>
@@ -4442,6 +4447,538 @@
     <p:extLst>
       <p:ext uri="{BB962C8B-B14F-4D97-AF65-F5344CB8AC3E}">
         <p14:creationId xmlns:p14="http://schemas.microsoft.com/office/powerpoint/2010/main" val="647903277"/>
+      </p:ext>
+    </p:extLst>
+  </p:cSld>
+  <p:clrMapOvr>
+    <a:masterClrMapping/>
+  </p:clrMapOvr>
+</p:sld>
+</file>
+
+<file path=ppt/slides/slide4.xml><?xml version="1.0" encoding="utf-8"?>
+<p:sld xmlns:a="http://schemas.openxmlformats.org/drawingml/2006/main" xmlns:r="http://schemas.openxmlformats.org/officeDocument/2006/relationships" xmlns:p="http://schemas.openxmlformats.org/presentationml/2006/main">
+  <p:cSld>
+    <p:spTree>
+      <p:nvGrpSpPr>
+        <p:cNvPr id="1" name=""/>
+        <p:cNvGrpSpPr/>
+        <p:nvPr/>
+      </p:nvGrpSpPr>
+      <p:grpSpPr>
+        <a:xfrm>
+          <a:off x="0" y="0"/>
+          <a:ext cx="0" cy="0"/>
+          <a:chOff x="0" y="0"/>
+          <a:chExt cx="0" cy="0"/>
+        </a:xfrm>
+      </p:grpSpPr>
+      <p:sp>
+        <p:nvSpPr>
+          <p:cNvPr id="2" name="Title 1">
+            <a:extLst>
+              <a:ext uri="{FF2B5EF4-FFF2-40B4-BE49-F238E27FC236}">
+                <a16:creationId xmlns:a16="http://schemas.microsoft.com/office/drawing/2014/main" id="{581B8566-0410-43D3-9187-A0D1451CB2A1}"/>
+              </a:ext>
+            </a:extLst>
+          </p:cNvPr>
+          <p:cNvSpPr>
+            <a:spLocks noGrp="1"/>
+          </p:cNvSpPr>
+          <p:nvPr>
+            <p:ph type="title"/>
+          </p:nvPr>
+        </p:nvSpPr>
+        <p:spPr>
+          <a:xfrm>
+            <a:off x="581192" y="702156"/>
+            <a:ext cx="11029616" cy="645632"/>
+          </a:xfrm>
+        </p:spPr>
+        <p:txBody>
+          <a:bodyPr/>
+          <a:lstStyle/>
+          <a:p>
+            <a:r>
+              <a:rPr lang="en-US" dirty="0" err="1"/>
+              <a:t>ActivemQ</a:t>
+            </a:r>
+            <a:r>
+              <a:rPr lang="en-US" dirty="0"/>
+              <a:t> admin page</a:t>
+            </a:r>
+          </a:p>
+        </p:txBody>
+      </p:sp>
+      <p:pic>
+        <p:nvPicPr>
+          <p:cNvPr id="4" name="Picture 3">
+            <a:extLst>
+              <a:ext uri="{FF2B5EF4-FFF2-40B4-BE49-F238E27FC236}">
+                <a16:creationId xmlns:a16="http://schemas.microsoft.com/office/drawing/2014/main" id="{59585728-A95A-42D3-9BFF-40A0BEFBCBEC}"/>
+              </a:ext>
+            </a:extLst>
+          </p:cNvPr>
+          <p:cNvPicPr>
+            <a:picLocks noChangeAspect="1"/>
+          </p:cNvPicPr>
+          <p:nvPr/>
+        </p:nvPicPr>
+        <p:blipFill>
+          <a:blip r:embed="rId2"/>
+          <a:stretch>
+            <a:fillRect/>
+          </a:stretch>
+        </p:blipFill>
+        <p:spPr>
+          <a:xfrm>
+            <a:off x="581192" y="1426681"/>
+            <a:ext cx="7934325" cy="3038475"/>
+          </a:xfrm>
+          <a:prstGeom prst="rect">
+            <a:avLst/>
+          </a:prstGeom>
+        </p:spPr>
+      </p:pic>
+      <p:sp>
+        <p:nvSpPr>
+          <p:cNvPr id="5" name="TextBox 4">
+            <a:extLst>
+              <a:ext uri="{FF2B5EF4-FFF2-40B4-BE49-F238E27FC236}">
+                <a16:creationId xmlns:a16="http://schemas.microsoft.com/office/drawing/2014/main" id="{CBCEFA54-76E7-4FA2-BD37-6BD953F4D408}"/>
+              </a:ext>
+            </a:extLst>
+          </p:cNvPr>
+          <p:cNvSpPr txBox="1"/>
+          <p:nvPr/>
+        </p:nvSpPr>
+        <p:spPr>
+          <a:xfrm>
+            <a:off x="476250" y="4465156"/>
+            <a:ext cx="4168000" cy="369332"/>
+          </a:xfrm>
+          <a:prstGeom prst="rect">
+            <a:avLst/>
+          </a:prstGeom>
+          <a:noFill/>
+        </p:spPr>
+        <p:txBody>
+          <a:bodyPr wrap="none" rtlCol="0">
+            <a:spAutoFit/>
+          </a:bodyPr>
+          <a:lstStyle/>
+          <a:p>
+            <a:r>
+              <a:rPr lang="en-US" dirty="0"/>
+              <a:t>User name and password : admin, admin</a:t>
+            </a:r>
+          </a:p>
+        </p:txBody>
+      </p:sp>
+    </p:spTree>
+    <p:extLst>
+      <p:ext uri="{BB962C8B-B14F-4D97-AF65-F5344CB8AC3E}">
+        <p14:creationId xmlns:p14="http://schemas.microsoft.com/office/powerpoint/2010/main" val="3007601695"/>
+      </p:ext>
+    </p:extLst>
+  </p:cSld>
+  <p:clrMapOvr>
+    <a:masterClrMapping/>
+  </p:clrMapOvr>
+</p:sld>
+</file>
+
+<file path=ppt/slides/slide5.xml><?xml version="1.0" encoding="utf-8"?>
+<p:sld xmlns:a="http://schemas.openxmlformats.org/drawingml/2006/main" xmlns:r="http://schemas.openxmlformats.org/officeDocument/2006/relationships" xmlns:p="http://schemas.openxmlformats.org/presentationml/2006/main">
+  <p:cSld>
+    <p:spTree>
+      <p:nvGrpSpPr>
+        <p:cNvPr id="1" name=""/>
+        <p:cNvGrpSpPr/>
+        <p:nvPr/>
+      </p:nvGrpSpPr>
+      <p:grpSpPr>
+        <a:xfrm>
+          <a:off x="0" y="0"/>
+          <a:ext cx="0" cy="0"/>
+          <a:chOff x="0" y="0"/>
+          <a:chExt cx="0" cy="0"/>
+        </a:xfrm>
+      </p:grpSpPr>
+      <p:sp>
+        <p:nvSpPr>
+          <p:cNvPr id="2" name="Title 1">
+            <a:extLst>
+              <a:ext uri="{FF2B5EF4-FFF2-40B4-BE49-F238E27FC236}">
+                <a16:creationId xmlns:a16="http://schemas.microsoft.com/office/drawing/2014/main" id="{F03F9EA0-C315-4483-AE55-BBF8EA254D0C}"/>
+              </a:ext>
+            </a:extLst>
+          </p:cNvPr>
+          <p:cNvSpPr>
+            <a:spLocks noGrp="1"/>
+          </p:cNvSpPr>
+          <p:nvPr>
+            <p:ph type="title"/>
+          </p:nvPr>
+        </p:nvSpPr>
+        <p:spPr>
+          <a:xfrm>
+            <a:off x="581192" y="702156"/>
+            <a:ext cx="11029616" cy="583719"/>
+          </a:xfrm>
+        </p:spPr>
+        <p:txBody>
+          <a:bodyPr/>
+          <a:lstStyle/>
+          <a:p>
+            <a:r>
+              <a:rPr lang="en-US" dirty="0"/>
+              <a:t>Message Types</a:t>
+            </a:r>
+          </a:p>
+        </p:txBody>
+      </p:sp>
+      <p:pic>
+        <p:nvPicPr>
+          <p:cNvPr id="4" name="Picture 3">
+            <a:extLst>
+              <a:ext uri="{FF2B5EF4-FFF2-40B4-BE49-F238E27FC236}">
+                <a16:creationId xmlns:a16="http://schemas.microsoft.com/office/drawing/2014/main" id="{D1DFF3E0-74F0-4A4A-9F0A-D81FB5C8E24D}"/>
+              </a:ext>
+            </a:extLst>
+          </p:cNvPr>
+          <p:cNvPicPr>
+            <a:picLocks noChangeAspect="1"/>
+          </p:cNvPicPr>
+          <p:nvPr/>
+        </p:nvPicPr>
+        <p:blipFill>
+          <a:blip r:embed="rId2"/>
+          <a:stretch>
+            <a:fillRect/>
+          </a:stretch>
+        </p:blipFill>
+        <p:spPr>
+          <a:xfrm>
+            <a:off x="672940" y="1200150"/>
+            <a:ext cx="10846119" cy="5657850"/>
+          </a:xfrm>
+          <a:prstGeom prst="rect">
+            <a:avLst/>
+          </a:prstGeom>
+        </p:spPr>
+      </p:pic>
+    </p:spTree>
+    <p:extLst>
+      <p:ext uri="{BB962C8B-B14F-4D97-AF65-F5344CB8AC3E}">
+        <p14:creationId xmlns:p14="http://schemas.microsoft.com/office/powerpoint/2010/main" val="1029593529"/>
+      </p:ext>
+    </p:extLst>
+  </p:cSld>
+  <p:clrMapOvr>
+    <a:masterClrMapping/>
+  </p:clrMapOvr>
+</p:sld>
+</file>
+
+<file path=ppt/slides/slide6.xml><?xml version="1.0" encoding="utf-8"?>
+<p:sld xmlns:a="http://schemas.openxmlformats.org/drawingml/2006/main" xmlns:r="http://schemas.openxmlformats.org/officeDocument/2006/relationships" xmlns:p="http://schemas.openxmlformats.org/presentationml/2006/main">
+  <p:cSld>
+    <p:spTree>
+      <p:nvGrpSpPr>
+        <p:cNvPr id="1" name=""/>
+        <p:cNvGrpSpPr/>
+        <p:nvPr/>
+      </p:nvGrpSpPr>
+      <p:grpSpPr>
+        <a:xfrm>
+          <a:off x="0" y="0"/>
+          <a:ext cx="0" cy="0"/>
+          <a:chOff x="0" y="0"/>
+          <a:chExt cx="0" cy="0"/>
+        </a:xfrm>
+      </p:grpSpPr>
+      <p:sp>
+        <p:nvSpPr>
+          <p:cNvPr id="2" name="Title 1">
+            <a:extLst>
+              <a:ext uri="{FF2B5EF4-FFF2-40B4-BE49-F238E27FC236}">
+                <a16:creationId xmlns:a16="http://schemas.microsoft.com/office/drawing/2014/main" id="{70D69063-86DD-4C0C-8442-1C6F90E0DCAB}"/>
+              </a:ext>
+            </a:extLst>
+          </p:cNvPr>
+          <p:cNvSpPr>
+            <a:spLocks noGrp="1"/>
+          </p:cNvSpPr>
+          <p:nvPr>
+            <p:ph type="title"/>
+          </p:nvPr>
+        </p:nvSpPr>
+        <p:spPr>
+          <a:xfrm>
+            <a:off x="581192" y="702156"/>
+            <a:ext cx="11029616" cy="536094"/>
+          </a:xfrm>
+        </p:spPr>
+        <p:txBody>
+          <a:bodyPr/>
+          <a:lstStyle/>
+          <a:p>
+            <a:r>
+              <a:rPr lang="en-US" dirty="0"/>
+              <a:t>Queue</a:t>
+            </a:r>
+          </a:p>
+        </p:txBody>
+      </p:sp>
+      <p:pic>
+        <p:nvPicPr>
+          <p:cNvPr id="4" name="Picture 3">
+            <a:extLst>
+              <a:ext uri="{FF2B5EF4-FFF2-40B4-BE49-F238E27FC236}">
+                <a16:creationId xmlns:a16="http://schemas.microsoft.com/office/drawing/2014/main" id="{D21906AC-6685-45A7-B879-9698B66B30F0}"/>
+              </a:ext>
+            </a:extLst>
+          </p:cNvPr>
+          <p:cNvPicPr>
+            <a:picLocks noChangeAspect="1"/>
+          </p:cNvPicPr>
+          <p:nvPr/>
+        </p:nvPicPr>
+        <p:blipFill>
+          <a:blip r:embed="rId2"/>
+          <a:stretch>
+            <a:fillRect/>
+          </a:stretch>
+        </p:blipFill>
+        <p:spPr>
+          <a:xfrm>
+            <a:off x="251729" y="1304925"/>
+            <a:ext cx="10888442" cy="5353049"/>
+          </a:xfrm>
+          <a:prstGeom prst="rect">
+            <a:avLst/>
+          </a:prstGeom>
+        </p:spPr>
+      </p:pic>
+    </p:spTree>
+    <p:extLst>
+      <p:ext uri="{BB962C8B-B14F-4D97-AF65-F5344CB8AC3E}">
+        <p14:creationId xmlns:p14="http://schemas.microsoft.com/office/powerpoint/2010/main" val="80457954"/>
+      </p:ext>
+    </p:extLst>
+  </p:cSld>
+  <p:clrMapOvr>
+    <a:masterClrMapping/>
+  </p:clrMapOvr>
+</p:sld>
+</file>
+
+<file path=ppt/slides/slide7.xml><?xml version="1.0" encoding="utf-8"?>
+<p:sld xmlns:a="http://schemas.openxmlformats.org/drawingml/2006/main" xmlns:r="http://schemas.openxmlformats.org/officeDocument/2006/relationships" xmlns:p="http://schemas.openxmlformats.org/presentationml/2006/main">
+  <p:cSld>
+    <p:spTree>
+      <p:nvGrpSpPr>
+        <p:cNvPr id="1" name=""/>
+        <p:cNvGrpSpPr/>
+        <p:nvPr/>
+      </p:nvGrpSpPr>
+      <p:grpSpPr>
+        <a:xfrm>
+          <a:off x="0" y="0"/>
+          <a:ext cx="0" cy="0"/>
+          <a:chOff x="0" y="0"/>
+          <a:chExt cx="0" cy="0"/>
+        </a:xfrm>
+      </p:grpSpPr>
+      <p:sp>
+        <p:nvSpPr>
+          <p:cNvPr id="2" name="Title 1">
+            <a:extLst>
+              <a:ext uri="{FF2B5EF4-FFF2-40B4-BE49-F238E27FC236}">
+                <a16:creationId xmlns:a16="http://schemas.microsoft.com/office/drawing/2014/main" id="{899DDF24-B1F1-4FF0-AB5D-3AB97308F2C4}"/>
+              </a:ext>
+            </a:extLst>
+          </p:cNvPr>
+          <p:cNvSpPr>
+            <a:spLocks noGrp="1"/>
+          </p:cNvSpPr>
+          <p:nvPr>
+            <p:ph type="title"/>
+          </p:nvPr>
+        </p:nvSpPr>
+        <p:spPr>
+          <a:xfrm>
+            <a:off x="581192" y="702156"/>
+            <a:ext cx="11029616" cy="488469"/>
+          </a:xfrm>
+        </p:spPr>
+        <p:txBody>
+          <a:bodyPr>
+            <a:normAutofit fontScale="90000"/>
+          </a:bodyPr>
+          <a:lstStyle/>
+          <a:p>
+            <a:r>
+              <a:rPr lang="en-US" dirty="0"/>
+              <a:t>TOPIC</a:t>
+            </a:r>
+          </a:p>
+        </p:txBody>
+      </p:sp>
+      <p:pic>
+        <p:nvPicPr>
+          <p:cNvPr id="4" name="Picture 3">
+            <a:extLst>
+              <a:ext uri="{FF2B5EF4-FFF2-40B4-BE49-F238E27FC236}">
+                <a16:creationId xmlns:a16="http://schemas.microsoft.com/office/drawing/2014/main" id="{488DC795-2C93-47DC-BFEB-3475168C9B88}"/>
+              </a:ext>
+            </a:extLst>
+          </p:cNvPr>
+          <p:cNvPicPr>
+            <a:picLocks noChangeAspect="1"/>
+          </p:cNvPicPr>
+          <p:nvPr/>
+        </p:nvPicPr>
+        <p:blipFill>
+          <a:blip r:embed="rId2"/>
+          <a:stretch>
+            <a:fillRect/>
+          </a:stretch>
+        </p:blipFill>
+        <p:spPr>
+          <a:xfrm>
+            <a:off x="0" y="1190624"/>
+            <a:ext cx="10667147" cy="5667375"/>
+          </a:xfrm>
+          <a:prstGeom prst="rect">
+            <a:avLst/>
+          </a:prstGeom>
+        </p:spPr>
+      </p:pic>
+    </p:spTree>
+    <p:extLst>
+      <p:ext uri="{BB962C8B-B14F-4D97-AF65-F5344CB8AC3E}">
+        <p14:creationId xmlns:p14="http://schemas.microsoft.com/office/powerpoint/2010/main" val="2972191447"/>
+      </p:ext>
+    </p:extLst>
+  </p:cSld>
+  <p:clrMapOvr>
+    <a:masterClrMapping/>
+  </p:clrMapOvr>
+</p:sld>
+</file>
+
+<file path=ppt/slides/slide8.xml><?xml version="1.0" encoding="utf-8"?>
+<p:sld xmlns:a="http://schemas.openxmlformats.org/drawingml/2006/main" xmlns:r="http://schemas.openxmlformats.org/officeDocument/2006/relationships" xmlns:p="http://schemas.openxmlformats.org/presentationml/2006/main">
+  <p:cSld>
+    <p:spTree>
+      <p:nvGrpSpPr>
+        <p:cNvPr id="1" name=""/>
+        <p:cNvGrpSpPr/>
+        <p:nvPr/>
+      </p:nvGrpSpPr>
+      <p:grpSpPr>
+        <a:xfrm>
+          <a:off x="0" y="0"/>
+          <a:ext cx="0" cy="0"/>
+          <a:chOff x="0" y="0"/>
+          <a:chExt cx="0" cy="0"/>
+        </a:xfrm>
+      </p:grpSpPr>
+      <p:sp>
+        <p:nvSpPr>
+          <p:cNvPr id="2" name="Title 1">
+            <a:extLst>
+              <a:ext uri="{FF2B5EF4-FFF2-40B4-BE49-F238E27FC236}">
+                <a16:creationId xmlns:a16="http://schemas.microsoft.com/office/drawing/2014/main" id="{EF969192-D893-410B-A20B-0191A3A7353F}"/>
+              </a:ext>
+            </a:extLst>
+          </p:cNvPr>
+          <p:cNvSpPr>
+            <a:spLocks noGrp="1"/>
+          </p:cNvSpPr>
+          <p:nvPr>
+            <p:ph type="title"/>
+          </p:nvPr>
+        </p:nvSpPr>
+        <p:spPr>
+          <a:xfrm>
+            <a:off x="581192" y="702156"/>
+            <a:ext cx="11029616" cy="478944"/>
+          </a:xfrm>
+        </p:spPr>
+        <p:txBody>
+          <a:bodyPr>
+            <a:normAutofit fontScale="90000"/>
+          </a:bodyPr>
+          <a:lstStyle/>
+          <a:p>
+            <a:r>
+              <a:rPr lang="en-US" dirty="0"/>
+              <a:t>AMQP 1.0 library for </a:t>
+            </a:r>
+            <a:r>
+              <a:rPr lang="en-US" dirty="0" err="1"/>
+              <a:t>.Net</a:t>
+            </a:r>
+            <a:endParaRPr lang="en-US" dirty="0"/>
+          </a:p>
+        </p:txBody>
+      </p:sp>
+      <p:sp>
+        <p:nvSpPr>
+          <p:cNvPr id="4" name="Rectangle 3">
+            <a:extLst>
+              <a:ext uri="{FF2B5EF4-FFF2-40B4-BE49-F238E27FC236}">
+                <a16:creationId xmlns:a16="http://schemas.microsoft.com/office/drawing/2014/main" id="{E8798A8F-A4D9-41E7-8E6C-5BEE685B245C}"/>
+              </a:ext>
+            </a:extLst>
+          </p:cNvPr>
+          <p:cNvSpPr/>
+          <p:nvPr/>
+        </p:nvSpPr>
+        <p:spPr>
+          <a:xfrm>
+            <a:off x="581192" y="1181100"/>
+            <a:ext cx="4680897" cy="923330"/>
+          </a:xfrm>
+          <a:prstGeom prst="rect">
+            <a:avLst/>
+          </a:prstGeom>
+        </p:spPr>
+        <p:txBody>
+          <a:bodyPr wrap="none">
+            <a:spAutoFit/>
+          </a:bodyPr>
+          <a:lstStyle/>
+          <a:p>
+            <a:r>
+              <a:rPr lang="en-US" dirty="0">
+                <a:hlinkClick r:id="rId2"/>
+              </a:rPr>
+              <a:t>http://azure.github.io/amqpnetlite/</a:t>
+            </a:r>
+            <a:endParaRPr lang="en-US" dirty="0"/>
+          </a:p>
+          <a:p>
+            <a:r>
+              <a:rPr lang="en-US">
+                <a:hlinkClick r:id="rId3"/>
+              </a:rPr>
+              <a:t>https://www.nuget.org/packages/amqpnetlite</a:t>
+            </a:r>
+            <a:endParaRPr lang="en-US"/>
+          </a:p>
+          <a:p>
+            <a:endParaRPr lang="en-US" dirty="0"/>
+          </a:p>
+        </p:txBody>
+      </p:sp>
+    </p:spTree>
+    <p:extLst>
+      <p:ext uri="{BB962C8B-B14F-4D97-AF65-F5344CB8AC3E}">
+        <p14:creationId xmlns:p14="http://schemas.microsoft.com/office/powerpoint/2010/main" val="246203120"/>
       </p:ext>
     </p:extLst>
   </p:cSld>
@@ -4721,24 +5258,6 @@
 </file>
 
 <file path=customXml/item1.xml><?xml version="1.0" encoding="utf-8"?>
-<?mso-contentType ?>
-<FormTemplates xmlns="http://schemas.microsoft.com/sharepoint/v3/contenttype/forms">
-  <Display>DocumentLibraryForm</Display>
-  <Edit>DocumentLibraryForm</Edit>
-  <New>DocumentLibraryForm</New>
-</FormTemplates>
-</file>
-
-<file path=customXml/item2.xml><?xml version="1.0" encoding="utf-8"?>
-<p:properties xmlns:p="http://schemas.microsoft.com/office/2006/metadata/properties" xmlns:xsi="http://www.w3.org/2001/XMLSchema-instance" xmlns:pc="http://schemas.microsoft.com/office/infopath/2007/PartnerControls">
-  <documentManagement>
-    <Status xmlns="71af3243-3dd4-4a8d-8c0d-dd76da1f02a5">Not started</Status>
-    <MediaServiceKeyPoints xmlns="71af3243-3dd4-4a8d-8c0d-dd76da1f02a5" xsi:nil="true"/>
-  </documentManagement>
-</p:properties>
-</file>
-
-<file path=customXml/item3.xml><?xml version="1.0" encoding="utf-8"?>
 <ct:contentTypeSchema xmlns:ct="http://schemas.microsoft.com/office/2006/metadata/contentType" xmlns:ma="http://schemas.microsoft.com/office/2006/metadata/properties/metaAttributes" ct:_="" ma:_="" ma:contentTypeName="Document" ma:contentTypeID="0x01010079F111ED35F8CC479449609E8A0923A6" ma:contentTypeVersion="12" ma:contentTypeDescription="Create a new document." ma:contentTypeScope="" ma:versionID="a410dd7f93c95333ffa1b60ed6adedd1">
   <xsd:schema xmlns:xsd="http://www.w3.org/2001/XMLSchema" xmlns:xs="http://www.w3.org/2001/XMLSchema" xmlns:p="http://schemas.microsoft.com/office/2006/metadata/properties" xmlns:ns2="71af3243-3dd4-4a8d-8c0d-dd76da1f02a5" xmlns:ns3="16c05727-aa75-4e4a-9b5f-8a80a1165891" targetNamespace="http://schemas.microsoft.com/office/2006/metadata/properties" ma:root="true" ma:fieldsID="a936d9baba76aa3866493feff160faab" ns2:_="" ns3:_="">
     <xsd:import namespace="71af3243-3dd4-4a8d-8c0d-dd76da1f02a5"/>
@@ -4959,25 +5478,25 @@
 </ct:contentTypeSchema>
 </file>
 
-<file path=customXml/itemProps1.xml><?xml version="1.0" encoding="utf-8"?>
-<ds:datastoreItem xmlns:ds="http://schemas.openxmlformats.org/officeDocument/2006/customXml" ds:itemID="{927BD4C1-B6B1-4715-ABF9-E660A51A4EA0}">
-  <ds:schemaRefs>
-    <ds:schemaRef ds:uri="http://schemas.microsoft.com/sharepoint/v3/contenttype/forms"/>
-  </ds:schemaRefs>
-</ds:datastoreItem>
+<file path=customXml/item2.xml><?xml version="1.0" encoding="utf-8"?>
+<p:properties xmlns:p="http://schemas.microsoft.com/office/2006/metadata/properties" xmlns:xsi="http://www.w3.org/2001/XMLSchema-instance" xmlns:pc="http://schemas.microsoft.com/office/infopath/2007/PartnerControls">
+  <documentManagement>
+    <Status xmlns="71af3243-3dd4-4a8d-8c0d-dd76da1f02a5">Not started</Status>
+    <MediaServiceKeyPoints xmlns="71af3243-3dd4-4a8d-8c0d-dd76da1f02a5" xsi:nil="true"/>
+  </documentManagement>
+</p:properties>
 </file>
 
-<file path=customXml/itemProps2.xml><?xml version="1.0" encoding="utf-8"?>
-<ds:datastoreItem xmlns:ds="http://schemas.openxmlformats.org/officeDocument/2006/customXml" ds:itemID="{8D289AE2-D2AE-49D1-AFAC-3A79F6794255}">
-  <ds:schemaRefs>
-    <ds:schemaRef ds:uri="http://schemas.microsoft.com/office/2006/metadata/properties"/>
-    <ds:schemaRef ds:uri="http://schemas.microsoft.com/office/infopath/2007/PartnerControls"/>
-    <ds:schemaRef ds:uri="71af3243-3dd4-4a8d-8c0d-dd76da1f02a5"/>
-  </ds:schemaRefs>
-</ds:datastoreItem>
+<file path=customXml/item3.xml><?xml version="1.0" encoding="utf-8"?>
+<?mso-contentType ?>
+<FormTemplates xmlns="http://schemas.microsoft.com/sharepoint/v3/contenttype/forms">
+  <Display>DocumentLibraryForm</Display>
+  <Edit>DocumentLibraryForm</Edit>
+  <New>DocumentLibraryForm</New>
+</FormTemplates>
 </file>
 
-<file path=customXml/itemProps3.xml><?xml version="1.0" encoding="utf-8"?>
+<file path=customXml/itemProps1.xml><?xml version="1.0" encoding="utf-8"?>
 <ds:datastoreItem xmlns:ds="http://schemas.openxmlformats.org/officeDocument/2006/customXml" ds:itemID="{41E7CA09-9778-4414-AE97-8064B12DA30E}">
   <ds:schemaRefs>
     <ds:schemaRef ds:uri="http://schemas.microsoft.com/office/2006/metadata/contentType"/>
@@ -4994,4 +5513,22 @@
     <ds:schemaRef ds:uri="http://schemas.microsoft.com/internal/obd"/>
   </ds:schemaRefs>
 </ds:datastoreItem>
+</file>
+
+<file path=customXml/itemProps2.xml><?xml version="1.0" encoding="utf-8"?>
+<ds:datastoreItem xmlns:ds="http://schemas.openxmlformats.org/officeDocument/2006/customXml" ds:itemID="{8D289AE2-D2AE-49D1-AFAC-3A79F6794255}">
+  <ds:schemaRefs>
+    <ds:schemaRef ds:uri="http://schemas.microsoft.com/office/2006/metadata/properties"/>
+    <ds:schemaRef ds:uri="http://schemas.microsoft.com/office/infopath/2007/PartnerControls"/>
+    <ds:schemaRef ds:uri="71af3243-3dd4-4a8d-8c0d-dd76da1f02a5"/>
+  </ds:schemaRefs>
+</ds:datastoreItem>
+</file>
+
+<file path=customXml/itemProps3.xml><?xml version="1.0" encoding="utf-8"?>
+<ds:datastoreItem xmlns:ds="http://schemas.openxmlformats.org/officeDocument/2006/customXml" ds:itemID="{927BD4C1-B6B1-4715-ABF9-E660A51A4EA0}">
+  <ds:schemaRefs>
+    <ds:schemaRef ds:uri="http://schemas.microsoft.com/sharepoint/v3/contenttype/forms"/>
+  </ds:schemaRefs>
+</ds:datastoreItem>
 </file>
</xml_diff>

<commit_message>
ActiveMQTopic : The topic messages are only sent to active subscribers.
</commit_message>
<xml_diff>
--- a/Presentation/ActiveMQ.pptx
+++ b/Presentation/ActiveMQ.pptx
@@ -12,7 +12,8 @@
     <p:sldId id="262" r:id="rId9"/>
     <p:sldId id="263" r:id="rId10"/>
     <p:sldId id="264" r:id="rId11"/>
-    <p:sldId id="265" r:id="rId12"/>
+    <p:sldId id="266" r:id="rId12"/>
+    <p:sldId id="265" r:id="rId13"/>
   </p:sldIdLst>
   <p:sldSz cx="12192000" cy="6858000"/>
   <p:notesSz cx="6858000" cy="9144000"/>
@@ -357,7 +358,7 @@
           <a:p>
             <a:fld id="{ED291B17-9318-49DB-B28B-6E5994AE9581}" type="datetime1">
               <a:rPr lang="en-US" smtClean="0"/>
-              <a:t>3/2/2021</a:t>
+              <a:t>3/7/2021</a:t>
             </a:fld>
             <a:endParaRPr lang="en-US" dirty="0"/>
           </a:p>
@@ -560,7 +561,7 @@
           <a:p>
             <a:fld id="{2CED4963-E985-44C4-B8C4-FDD613B7C2F8}" type="datetime1">
               <a:rPr lang="en-US" smtClean="0"/>
-              <a:t>3/2/2021</a:t>
+              <a:t>3/7/2021</a:t>
             </a:fld>
             <a:endParaRPr lang="en-US" dirty="0"/>
           </a:p>
@@ -922,7 +923,7 @@
           <a:p>
             <a:fld id="{ED291B17-9318-49DB-B28B-6E5994AE9581}" type="datetime1">
               <a:rPr lang="en-US" smtClean="0"/>
-              <a:t>3/2/2021</a:t>
+              <a:t>3/7/2021</a:t>
             </a:fld>
             <a:endParaRPr lang="en-US" dirty="0"/>
           </a:p>
@@ -1120,7 +1121,7 @@
           <a:p>
             <a:fld id="{78DD82B9-B8EE-4375-B6FF-88FA6ABB15D9}" type="datetime1">
               <a:rPr lang="en-US" smtClean="0"/>
-              <a:t>3/2/2021</a:t>
+              <a:t>3/7/2021</a:t>
             </a:fld>
             <a:endParaRPr lang="en-US" dirty="0"/>
           </a:p>
@@ -1432,7 +1433,7 @@
           <a:p>
             <a:fld id="{B2497495-0637-405E-AE64-5CC7506D51F5}" type="datetime1">
               <a:rPr lang="en-US" smtClean="0"/>
-              <a:t>3/2/2021</a:t>
+              <a:t>3/7/2021</a:t>
             </a:fld>
             <a:endParaRPr lang="en-US" dirty="0"/>
           </a:p>
@@ -1685,7 +1686,7 @@
           <a:p>
             <a:fld id="{7BFFD690-9426-415D-8B65-26881E07B2D4}" type="datetime1">
               <a:rPr lang="en-US" smtClean="0"/>
-              <a:t>3/2/2021</a:t>
+              <a:t>3/7/2021</a:t>
             </a:fld>
             <a:endParaRPr lang="en-US" dirty="0"/>
           </a:p>
@@ -2107,7 +2108,7 @@
           <a:p>
             <a:fld id="{04C4989A-474C-40DE-95B9-011C28B71673}" type="datetime1">
               <a:rPr lang="en-US" smtClean="0"/>
-              <a:t>3/2/2021</a:t>
+              <a:t>3/7/2021</a:t>
             </a:fld>
             <a:endParaRPr lang="en-US" dirty="0"/>
           </a:p>
@@ -2230,7 +2231,7 @@
           <a:p>
             <a:fld id="{5DB4ED54-5B5E-4A04-93D3-5772E3CE3818}" type="datetime1">
               <a:rPr lang="en-US" smtClean="0"/>
-              <a:t>3/2/2021</a:t>
+              <a:t>3/7/2021</a:t>
             </a:fld>
             <a:endParaRPr lang="en-US" dirty="0"/>
           </a:p>
@@ -2325,7 +2326,7 @@
           <a:p>
             <a:fld id="{4EDE50D6-574B-40AF-946F-D52A04ADE379}" type="datetime1">
               <a:rPr lang="en-US" smtClean="0"/>
-              <a:t>3/2/2021</a:t>
+              <a:t>3/7/2021</a:t>
             </a:fld>
             <a:endParaRPr lang="en-US" dirty="0"/>
           </a:p>
@@ -2702,7 +2703,7 @@
           <a:p>
             <a:fld id="{D82884F1-FFEA-405F-9602-3DCA865EDA4E}" type="datetime1">
               <a:rPr lang="en-US" smtClean="0"/>
-              <a:t>3/2/2021</a:t>
+              <a:t>3/7/2021</a:t>
             </a:fld>
             <a:endParaRPr lang="en-US" dirty="0"/>
           </a:p>
@@ -2995,7 +2996,7 @@
           <a:p>
             <a:fld id="{7E18DB4A-8810-4A10-AD5C-D5E2C667F5B3}" type="datetime1">
               <a:rPr lang="en-US" smtClean="0"/>
-              <a:t>3/2/2021</a:t>
+              <a:t>3/7/2021</a:t>
             </a:fld>
             <a:endParaRPr lang="en-US" dirty="0"/>
           </a:p>
@@ -3210,7 +3211,7 @@
           <a:p>
             <a:fld id="{ED291B17-9318-49DB-B28B-6E5994AE9581}" type="datetime1">
               <a:rPr lang="en-US" smtClean="0"/>
-              <a:t>3/2/2021</a:t>
+              <a:t>3/7/2021</a:t>
             </a:fld>
             <a:endParaRPr lang="en-US" dirty="0"/>
           </a:p>
@@ -4891,6 +4892,189 @@
           <p:cNvPr id="2" name="Title 1">
             <a:extLst>
               <a:ext uri="{FF2B5EF4-FFF2-40B4-BE49-F238E27FC236}">
+                <a16:creationId xmlns:a16="http://schemas.microsoft.com/office/drawing/2014/main" id="{DBF53D45-AF85-41F5-AA5F-01A2CE7C5A93}"/>
+              </a:ext>
+            </a:extLst>
+          </p:cNvPr>
+          <p:cNvSpPr>
+            <a:spLocks noGrp="1"/>
+          </p:cNvSpPr>
+          <p:nvPr>
+            <p:ph type="title"/>
+          </p:nvPr>
+        </p:nvSpPr>
+        <p:spPr>
+          <a:xfrm>
+            <a:off x="581192" y="702156"/>
+            <a:ext cx="11029616" cy="388413"/>
+          </a:xfrm>
+        </p:spPr>
+        <p:txBody>
+          <a:bodyPr>
+            <a:normAutofit fontScale="90000"/>
+          </a:bodyPr>
+          <a:lstStyle/>
+          <a:p>
+            <a:r>
+              <a:rPr lang="en-US" dirty="0"/>
+              <a:t>Queue versus topic</a:t>
+            </a:r>
+          </a:p>
+        </p:txBody>
+      </p:sp>
+      <p:sp>
+        <p:nvSpPr>
+          <p:cNvPr id="4" name="TextBox 3">
+            <a:extLst>
+              <a:ext uri="{FF2B5EF4-FFF2-40B4-BE49-F238E27FC236}">
+                <a16:creationId xmlns:a16="http://schemas.microsoft.com/office/drawing/2014/main" id="{FDA3CDC4-B801-4D52-9C7B-A6F2D5609EB8}"/>
+              </a:ext>
+            </a:extLst>
+          </p:cNvPr>
+          <p:cNvSpPr txBox="1"/>
+          <p:nvPr/>
+        </p:nvSpPr>
+        <p:spPr>
+          <a:xfrm>
+            <a:off x="153903" y="1096547"/>
+            <a:ext cx="12206098" cy="4247317"/>
+          </a:xfrm>
+          <a:prstGeom prst="rect">
+            <a:avLst/>
+          </a:prstGeom>
+          <a:noFill/>
+        </p:spPr>
+        <p:txBody>
+          <a:bodyPr wrap="none" rtlCol="0">
+            <a:spAutoFit/>
+          </a:bodyPr>
+          <a:lstStyle/>
+          <a:p>
+            <a:r>
+              <a:rPr lang="en-US" dirty="0"/>
+              <a:t>TOPIC :  These are effectively a way to communicate between two end points; the important thing here is that there must be</a:t>
+            </a:r>
+          </a:p>
+          <a:p>
+            <a:r>
+              <a:rPr lang="en-US" dirty="0"/>
+              <a:t> for it to work. When you publish a topic message, it is published to any “listeners”.</a:t>
+            </a:r>
+          </a:p>
+          <a:p>
+            <a:r>
+              <a:rPr lang="en-US" dirty="0"/>
+              <a:t> If your app wasn’t listening, then that’s hard luck. The use cases here are situations whereby a message might be time </a:t>
+            </a:r>
+          </a:p>
+          <a:p>
+            <a:r>
+              <a:rPr lang="en-US" dirty="0"/>
+              <a:t>sensitive; for example, a stock price had just changed or a server needs the client to refresh because there is more data. </a:t>
+            </a:r>
+          </a:p>
+          <a:p>
+            <a:r>
+              <a:rPr lang="en-US" dirty="0"/>
+              <a:t>There are such things as durable topics, but for now.</a:t>
+            </a:r>
+          </a:p>
+          <a:p>
+            <a:endParaRPr lang="en-US" dirty="0"/>
+          </a:p>
+          <a:p>
+            <a:r>
+              <a:rPr lang="en-US"/>
+              <a:t>CAVEAT : The topic messages are only sent to active subscribers.</a:t>
+            </a:r>
+          </a:p>
+          <a:p>
+            <a:endParaRPr lang="en-US" dirty="0"/>
+          </a:p>
+          <a:p>
+            <a:r>
+              <a:rPr lang="en-US" dirty="0"/>
+              <a:t>Queue: Queues on the other hand have a persistent nature. Once you add a message to the queue, it will remain there until </a:t>
+            </a:r>
+          </a:p>
+          <a:p>
+            <a:r>
+              <a:rPr lang="en-US" dirty="0"/>
+              <a:t>it is handled. Use cases for this might include a notification to send an e-mail, a chat program, or a request to place a sales </a:t>
+            </a:r>
+          </a:p>
+          <a:p>
+            <a:r>
+              <a:rPr lang="en-US" dirty="0"/>
+              <a:t>order. The queue will be read on a first in, first out basis, and so you can load balance a queue: that is, you can have </a:t>
+            </a:r>
+            <a:r>
+              <a:rPr lang="en-US" i="1" dirty="0"/>
+              <a:t>n</a:t>
+            </a:r>
+            <a:r>
+              <a:rPr lang="en-US" dirty="0"/>
+              <a:t> </a:t>
+            </a:r>
+          </a:p>
+          <a:p>
+            <a:r>
+              <a:rPr lang="en-US" dirty="0"/>
+              <a:t>listeners, and they will all process the messages in order from the queue.</a:t>
+            </a:r>
+          </a:p>
+          <a:p>
+            <a:endParaRPr lang="en-US" dirty="0"/>
+          </a:p>
+          <a:p>
+            <a:r>
+              <a:rPr lang="en-US" dirty="0">
+                <a:hlinkClick r:id="rId2"/>
+              </a:rPr>
+              <a:t>https://www.pmichaels.net/2016/09/29/a-c-programmers-guide-to-installing-running-and-messaging-with-activemq/</a:t>
+            </a:r>
+            <a:endParaRPr lang="en-US" dirty="0"/>
+          </a:p>
+          <a:p>
+            <a:endParaRPr lang="en-US" dirty="0"/>
+          </a:p>
+        </p:txBody>
+      </p:sp>
+    </p:spTree>
+    <p:extLst>
+      <p:ext uri="{BB962C8B-B14F-4D97-AF65-F5344CB8AC3E}">
+        <p14:creationId xmlns:p14="http://schemas.microsoft.com/office/powerpoint/2010/main" val="2850012607"/>
+      </p:ext>
+    </p:extLst>
+  </p:cSld>
+  <p:clrMapOvr>
+    <a:masterClrMapping/>
+  </p:clrMapOvr>
+</p:sld>
+</file>
+
+<file path=ppt/slides/slide9.xml><?xml version="1.0" encoding="utf-8"?>
+<p:sld xmlns:a="http://schemas.openxmlformats.org/drawingml/2006/main" xmlns:r="http://schemas.openxmlformats.org/officeDocument/2006/relationships" xmlns:p="http://schemas.openxmlformats.org/presentationml/2006/main">
+  <p:cSld>
+    <p:spTree>
+      <p:nvGrpSpPr>
+        <p:cNvPr id="1" name=""/>
+        <p:cNvGrpSpPr/>
+        <p:nvPr/>
+      </p:nvGrpSpPr>
+      <p:grpSpPr>
+        <a:xfrm>
+          <a:off x="0" y="0"/>
+          <a:ext cx="0" cy="0"/>
+          <a:chOff x="0" y="0"/>
+          <a:chExt cx="0" cy="0"/>
+        </a:xfrm>
+      </p:grpSpPr>
+      <p:sp>
+        <p:nvSpPr>
+          <p:cNvPr id="2" name="Title 1">
+            <a:extLst>
+              <a:ext uri="{FF2B5EF4-FFF2-40B4-BE49-F238E27FC236}">
                 <a16:creationId xmlns:a16="http://schemas.microsoft.com/office/drawing/2014/main" id="{EF969192-D893-410B-A20B-0191A3A7353F}"/>
               </a:ext>
             </a:extLst>
@@ -5258,6 +5442,24 @@
 </file>
 
 <file path=customXml/item1.xml><?xml version="1.0" encoding="utf-8"?>
+<?mso-contentType ?>
+<FormTemplates xmlns="http://schemas.microsoft.com/sharepoint/v3/contenttype/forms">
+  <Display>DocumentLibraryForm</Display>
+  <Edit>DocumentLibraryForm</Edit>
+  <New>DocumentLibraryForm</New>
+</FormTemplates>
+</file>
+
+<file path=customXml/item2.xml><?xml version="1.0" encoding="utf-8"?>
+<p:properties xmlns:p="http://schemas.microsoft.com/office/2006/metadata/properties" xmlns:xsi="http://www.w3.org/2001/XMLSchema-instance" xmlns:pc="http://schemas.microsoft.com/office/infopath/2007/PartnerControls">
+  <documentManagement>
+    <Status xmlns="71af3243-3dd4-4a8d-8c0d-dd76da1f02a5">Not started</Status>
+    <MediaServiceKeyPoints xmlns="71af3243-3dd4-4a8d-8c0d-dd76da1f02a5" xsi:nil="true"/>
+  </documentManagement>
+</p:properties>
+</file>
+
+<file path=customXml/item3.xml><?xml version="1.0" encoding="utf-8"?>
 <ct:contentTypeSchema xmlns:ct="http://schemas.microsoft.com/office/2006/metadata/contentType" xmlns:ma="http://schemas.microsoft.com/office/2006/metadata/properties/metaAttributes" ct:_="" ma:_="" ma:contentTypeName="Document" ma:contentTypeID="0x01010079F111ED35F8CC479449609E8A0923A6" ma:contentTypeVersion="12" ma:contentTypeDescription="Create a new document." ma:contentTypeScope="" ma:versionID="a410dd7f93c95333ffa1b60ed6adedd1">
   <xsd:schema xmlns:xsd="http://www.w3.org/2001/XMLSchema" xmlns:xs="http://www.w3.org/2001/XMLSchema" xmlns:p="http://schemas.microsoft.com/office/2006/metadata/properties" xmlns:ns2="71af3243-3dd4-4a8d-8c0d-dd76da1f02a5" xmlns:ns3="16c05727-aa75-4e4a-9b5f-8a80a1165891" targetNamespace="http://schemas.microsoft.com/office/2006/metadata/properties" ma:root="true" ma:fieldsID="a936d9baba76aa3866493feff160faab" ns2:_="" ns3:_="">
     <xsd:import namespace="71af3243-3dd4-4a8d-8c0d-dd76da1f02a5"/>
@@ -5478,25 +5680,25 @@
 </ct:contentTypeSchema>
 </file>
 
-<file path=customXml/item2.xml><?xml version="1.0" encoding="utf-8"?>
-<p:properties xmlns:p="http://schemas.microsoft.com/office/2006/metadata/properties" xmlns:xsi="http://www.w3.org/2001/XMLSchema-instance" xmlns:pc="http://schemas.microsoft.com/office/infopath/2007/PartnerControls">
-  <documentManagement>
-    <Status xmlns="71af3243-3dd4-4a8d-8c0d-dd76da1f02a5">Not started</Status>
-    <MediaServiceKeyPoints xmlns="71af3243-3dd4-4a8d-8c0d-dd76da1f02a5" xsi:nil="true"/>
-  </documentManagement>
-</p:properties>
+<file path=customXml/itemProps1.xml><?xml version="1.0" encoding="utf-8"?>
+<ds:datastoreItem xmlns:ds="http://schemas.openxmlformats.org/officeDocument/2006/customXml" ds:itemID="{927BD4C1-B6B1-4715-ABF9-E660A51A4EA0}">
+  <ds:schemaRefs>
+    <ds:schemaRef ds:uri="http://schemas.microsoft.com/sharepoint/v3/contenttype/forms"/>
+  </ds:schemaRefs>
+</ds:datastoreItem>
 </file>
 
-<file path=customXml/item3.xml><?xml version="1.0" encoding="utf-8"?>
-<?mso-contentType ?>
-<FormTemplates xmlns="http://schemas.microsoft.com/sharepoint/v3/contenttype/forms">
-  <Display>DocumentLibraryForm</Display>
-  <Edit>DocumentLibraryForm</Edit>
-  <New>DocumentLibraryForm</New>
-</FormTemplates>
+<file path=customXml/itemProps2.xml><?xml version="1.0" encoding="utf-8"?>
+<ds:datastoreItem xmlns:ds="http://schemas.openxmlformats.org/officeDocument/2006/customXml" ds:itemID="{8D289AE2-D2AE-49D1-AFAC-3A79F6794255}">
+  <ds:schemaRefs>
+    <ds:schemaRef ds:uri="http://schemas.microsoft.com/office/2006/metadata/properties"/>
+    <ds:schemaRef ds:uri="http://schemas.microsoft.com/office/infopath/2007/PartnerControls"/>
+    <ds:schemaRef ds:uri="71af3243-3dd4-4a8d-8c0d-dd76da1f02a5"/>
+  </ds:schemaRefs>
+</ds:datastoreItem>
 </file>
 
-<file path=customXml/itemProps1.xml><?xml version="1.0" encoding="utf-8"?>
+<file path=customXml/itemProps3.xml><?xml version="1.0" encoding="utf-8"?>
 <ds:datastoreItem xmlns:ds="http://schemas.openxmlformats.org/officeDocument/2006/customXml" ds:itemID="{41E7CA09-9778-4414-AE97-8064B12DA30E}">
   <ds:schemaRefs>
     <ds:schemaRef ds:uri="http://schemas.microsoft.com/office/2006/metadata/contentType"/>
@@ -5513,22 +5715,4 @@
     <ds:schemaRef ds:uri="http://schemas.microsoft.com/internal/obd"/>
   </ds:schemaRefs>
 </ds:datastoreItem>
-</file>
-
-<file path=customXml/itemProps2.xml><?xml version="1.0" encoding="utf-8"?>
-<ds:datastoreItem xmlns:ds="http://schemas.openxmlformats.org/officeDocument/2006/customXml" ds:itemID="{8D289AE2-D2AE-49D1-AFAC-3A79F6794255}">
-  <ds:schemaRefs>
-    <ds:schemaRef ds:uri="http://schemas.microsoft.com/office/2006/metadata/properties"/>
-    <ds:schemaRef ds:uri="http://schemas.microsoft.com/office/infopath/2007/PartnerControls"/>
-    <ds:schemaRef ds:uri="71af3243-3dd4-4a8d-8c0d-dd76da1f02a5"/>
-  </ds:schemaRefs>
-</ds:datastoreItem>
-</file>
-
-<file path=customXml/itemProps3.xml><?xml version="1.0" encoding="utf-8"?>
-<ds:datastoreItem xmlns:ds="http://schemas.openxmlformats.org/officeDocument/2006/customXml" ds:itemID="{927BD4C1-B6B1-4715-ABF9-E660A51A4EA0}">
-  <ds:schemaRefs>
-    <ds:schemaRef ds:uri="http://schemas.microsoft.com/sharepoint/v3/contenttype/forms"/>
-  </ds:schemaRefs>
-</ds:datastoreItem>
 </file>
</xml_diff>